<commit_message>
se agrego titulo a la presentacion
</commit_message>
<xml_diff>
--- a/ramas github.pptx
+++ b/ramas github.pptx
@@ -104,6 +104,11 @@
       </a:defRPr>
     </a:lvl9pPr>
   </p:defaultTextStyle>
+  <p:extLst>
+    <p:ext uri="{EFAFB233-063F-42B5-8137-9DF3F51BA10A}">
+      <p15:sldGuideLst xmlns:p15="http://schemas.microsoft.com/office/powerpoint/2012/main"/>
+    </p:ext>
+  </p:extLst>
 </p:presentation>
 </file>
 
@@ -202,7 +207,7 @@
           <a:effectLst/>
           <a:extLst>
             <a:ext uri="{91240B29-F687-4f45-9708-019B960494DF}">
-              <a14:hiddenLine xmlns:a14="http://schemas.microsoft.com/office/drawing/2010/main" xmlns="" w="9525">
+              <a14:hiddenLine xmlns="" xmlns:a14="http://schemas.microsoft.com/office/drawing/2010/main" w="9525">
                 <a:solidFill>
                   <a:srgbClr val="000000"/>
                 </a:solidFill>
@@ -1712,7 +1717,7 @@
           <a:ln/>
           <a:extLst>
             <a:ext uri="{91240B29-F687-4f45-9708-019B960494DF}">
-              <a14:hiddenLine xmlns:a14="http://schemas.microsoft.com/office/drawing/2010/main" xmlns="" w="9525">
+              <a14:hiddenLine xmlns="" xmlns:a14="http://schemas.microsoft.com/office/drawing/2010/main" w="9525">
                 <a:solidFill>
                   <a:srgbClr val="000000"/>
                 </a:solidFill>
@@ -1984,7 +1989,7 @@
           <a:ln/>
           <a:extLst>
             <a:ext uri="{91240B29-F687-4f45-9708-019B960494DF}">
-              <a14:hiddenLine xmlns:a14="http://schemas.microsoft.com/office/drawing/2010/main" xmlns="" w="9525">
+              <a14:hiddenLine xmlns="" xmlns:a14="http://schemas.microsoft.com/office/drawing/2010/main" w="9525">
                 <a:solidFill>
                   <a:srgbClr val="000000"/>
                 </a:solidFill>
@@ -2264,7 +2269,7 @@
           <a:ln/>
           <a:extLst>
             <a:ext uri="{91240B29-F687-4f45-9708-019B960494DF}">
-              <a14:hiddenLine xmlns:a14="http://schemas.microsoft.com/office/drawing/2010/main" xmlns="" w="9525">
+              <a14:hiddenLine xmlns="" xmlns:a14="http://schemas.microsoft.com/office/drawing/2010/main" w="9525">
                 <a:solidFill>
                   <a:srgbClr val="000000"/>
                 </a:solidFill>
@@ -2884,7 +2889,7 @@
           <a:ln/>
           <a:extLst>
             <a:ext uri="{91240B29-F687-4f45-9708-019B960494DF}">
-              <a14:hiddenLine xmlns:a14="http://schemas.microsoft.com/office/drawing/2010/main" xmlns="" w="9525">
+              <a14:hiddenLine xmlns="" xmlns:a14="http://schemas.microsoft.com/office/drawing/2010/main" w="9525">
                 <a:solidFill>
                   <a:srgbClr val="000000"/>
                 </a:solidFill>
@@ -3220,7 +3225,7 @@
           <a:ln/>
           <a:extLst>
             <a:ext uri="{91240B29-F687-4f45-9708-019B960494DF}">
-              <a14:hiddenLine xmlns:a14="http://schemas.microsoft.com/office/drawing/2010/main" xmlns="" w="9525">
+              <a14:hiddenLine xmlns="" xmlns:a14="http://schemas.microsoft.com/office/drawing/2010/main" w="9525">
                 <a:solidFill>
                   <a:srgbClr val="000000"/>
                 </a:solidFill>
@@ -3694,7 +3699,7 @@
           <a:ln/>
           <a:extLst>
             <a:ext uri="{91240B29-F687-4f45-9708-019B960494DF}">
-              <a14:hiddenLine xmlns:a14="http://schemas.microsoft.com/office/drawing/2010/main" xmlns="" w="9525">
+              <a14:hiddenLine xmlns="" xmlns:a14="http://schemas.microsoft.com/office/drawing/2010/main" w="9525">
                 <a:solidFill>
                   <a:srgbClr val="000000"/>
                 </a:solidFill>
@@ -4117,7 +4122,7 @@
           <a:ln/>
           <a:extLst>
             <a:ext uri="{91240B29-F687-4f45-9708-019B960494DF}">
-              <a14:hiddenLine xmlns:a14="http://schemas.microsoft.com/office/drawing/2010/main" xmlns="" w="9525">
+              <a14:hiddenLine xmlns="" xmlns:a14="http://schemas.microsoft.com/office/drawing/2010/main" w="9525">
                 <a:solidFill>
                   <a:srgbClr val="000000"/>
                 </a:solidFill>
@@ -5361,7 +5366,10 @@
           <a:bodyPr/>
           <a:lstStyle/>
           <a:p>
-            <a:endParaRPr lang="es-CO"/>
+            <a:r>
+              <a:rPr lang="es-CO" dirty="0"/>
+              <a:t>Gracias a la compañera </a:t>
+            </a:r>
           </a:p>
         </p:txBody>
       </p:sp>
@@ -5386,7 +5394,10 @@
           <a:bodyPr/>
           <a:lstStyle/>
           <a:p>
-            <a:endParaRPr lang="es-CO"/>
+            <a:r>
+              <a:rPr lang="es-CO"/>
+              <a:t>Por fin </a:t>
+            </a:r>
           </a:p>
         </p:txBody>
       </p:sp>

</xml_diff>